<commit_message>
docs: [U888-48, U888-49, U888-50, U888-51, U888-52, U888-53, U888-54, U888-55, U888-56, U888-57] log drawings and wireframe ppt updated
</commit_message>
<xml_diff>
--- a/wireframing/wireframes_part_1.pptx
+++ b/wireframing/wireframes_part_1.pptx
@@ -11,6 +11,7 @@
     <p:sldId id="259" r:id="rId5"/>
     <p:sldId id="260" r:id="rId6"/>
     <p:sldId id="262" r:id="rId7"/>
+    <p:sldId id="263" r:id="rId8"/>
   </p:sldIdLst>
   <p:sldSz cx="12192000" cy="6858000"/>
   <p:notesSz cx="6858000" cy="9144000"/>
@@ -266,7 +267,7 @@
           <a:p>
             <a:fld id="{552FEBA7-0CC5-404C-A4C7-482FE5E6CA26}" type="datetimeFigureOut">
               <a:rPr lang="en-CA" smtClean="0"/>
-              <a:t>19-Oct-2021</a:t>
+              <a:t>2021-10-20</a:t>
             </a:fld>
             <a:endParaRPr lang="en-CA"/>
           </a:p>
@@ -466,7 +467,7 @@
           <a:p>
             <a:fld id="{552FEBA7-0CC5-404C-A4C7-482FE5E6CA26}" type="datetimeFigureOut">
               <a:rPr lang="en-CA" smtClean="0"/>
-              <a:t>19-Oct-2021</a:t>
+              <a:t>2021-10-20</a:t>
             </a:fld>
             <a:endParaRPr lang="en-CA"/>
           </a:p>
@@ -676,7 +677,7 @@
           <a:p>
             <a:fld id="{552FEBA7-0CC5-404C-A4C7-482FE5E6CA26}" type="datetimeFigureOut">
               <a:rPr lang="en-CA" smtClean="0"/>
-              <a:t>19-Oct-2021</a:t>
+              <a:t>2021-10-20</a:t>
             </a:fld>
             <a:endParaRPr lang="en-CA"/>
           </a:p>
@@ -876,7 +877,7 @@
           <a:p>
             <a:fld id="{552FEBA7-0CC5-404C-A4C7-482FE5E6CA26}" type="datetimeFigureOut">
               <a:rPr lang="en-CA" smtClean="0"/>
-              <a:t>19-Oct-2021</a:t>
+              <a:t>2021-10-20</a:t>
             </a:fld>
             <a:endParaRPr lang="en-CA"/>
           </a:p>
@@ -1152,7 +1153,7 @@
           <a:p>
             <a:fld id="{552FEBA7-0CC5-404C-A4C7-482FE5E6CA26}" type="datetimeFigureOut">
               <a:rPr lang="en-CA" smtClean="0"/>
-              <a:t>19-Oct-2021</a:t>
+              <a:t>2021-10-20</a:t>
             </a:fld>
             <a:endParaRPr lang="en-CA"/>
           </a:p>
@@ -1420,7 +1421,7 @@
           <a:p>
             <a:fld id="{552FEBA7-0CC5-404C-A4C7-482FE5E6CA26}" type="datetimeFigureOut">
               <a:rPr lang="en-CA" smtClean="0"/>
-              <a:t>19-Oct-2021</a:t>
+              <a:t>2021-10-20</a:t>
             </a:fld>
             <a:endParaRPr lang="en-CA"/>
           </a:p>
@@ -1835,7 +1836,7 @@
           <a:p>
             <a:fld id="{552FEBA7-0CC5-404C-A4C7-482FE5E6CA26}" type="datetimeFigureOut">
               <a:rPr lang="en-CA" smtClean="0"/>
-              <a:t>19-Oct-2021</a:t>
+              <a:t>2021-10-20</a:t>
             </a:fld>
             <a:endParaRPr lang="en-CA"/>
           </a:p>
@@ -1977,7 +1978,7 @@
           <a:p>
             <a:fld id="{552FEBA7-0CC5-404C-A4C7-482FE5E6CA26}" type="datetimeFigureOut">
               <a:rPr lang="en-CA" smtClean="0"/>
-              <a:t>19-Oct-2021</a:t>
+              <a:t>2021-10-20</a:t>
             </a:fld>
             <a:endParaRPr lang="en-CA"/>
           </a:p>
@@ -2090,7 +2091,7 @@
           <a:p>
             <a:fld id="{552FEBA7-0CC5-404C-A4C7-482FE5E6CA26}" type="datetimeFigureOut">
               <a:rPr lang="en-CA" smtClean="0"/>
-              <a:t>19-Oct-2021</a:t>
+              <a:t>2021-10-20</a:t>
             </a:fld>
             <a:endParaRPr lang="en-CA"/>
           </a:p>
@@ -2403,7 +2404,7 @@
           <a:p>
             <a:fld id="{552FEBA7-0CC5-404C-A4C7-482FE5E6CA26}" type="datetimeFigureOut">
               <a:rPr lang="en-CA" smtClean="0"/>
-              <a:t>19-Oct-2021</a:t>
+              <a:t>2021-10-20</a:t>
             </a:fld>
             <a:endParaRPr lang="en-CA"/>
           </a:p>
@@ -2692,7 +2693,7 @@
           <a:p>
             <a:fld id="{552FEBA7-0CC5-404C-A4C7-482FE5E6CA26}" type="datetimeFigureOut">
               <a:rPr lang="en-CA" smtClean="0"/>
-              <a:t>19-Oct-2021</a:t>
+              <a:t>2021-10-20</a:t>
             </a:fld>
             <a:endParaRPr lang="en-CA"/>
           </a:p>
@@ -2935,7 +2936,7 @@
           <a:p>
             <a:fld id="{552FEBA7-0CC5-404C-A4C7-482FE5E6CA26}" type="datetimeFigureOut">
               <a:rPr lang="en-CA" smtClean="0"/>
-              <a:t>19-Oct-2021</a:t>
+              <a:t>2021-10-20</a:t>
             </a:fld>
             <a:endParaRPr lang="en-CA"/>
           </a:p>
@@ -3958,6 +3959,223 @@
 </p:sld>
 </file>
 
+<file path=ppt/slides/slide7.xml><?xml version="1.0" encoding="utf-8"?>
+<p:sld xmlns:a="http://schemas.openxmlformats.org/drawingml/2006/main" xmlns:r="http://schemas.openxmlformats.org/officeDocument/2006/relationships" xmlns:p="http://schemas.openxmlformats.org/presentationml/2006/main">
+  <p:cSld>
+    <p:spTree>
+      <p:nvGrpSpPr>
+        <p:cNvPr id="1" name=""/>
+        <p:cNvGrpSpPr/>
+        <p:nvPr/>
+      </p:nvGrpSpPr>
+      <p:grpSpPr>
+        <a:xfrm>
+          <a:off x="0" y="0"/>
+          <a:ext cx="0" cy="0"/>
+          <a:chOff x="0" y="0"/>
+          <a:chExt cx="0" cy="0"/>
+        </a:xfrm>
+      </p:grpSpPr>
+      <p:sp>
+        <p:nvSpPr>
+          <p:cNvPr id="2" name="Title 1">
+            <a:extLst>
+              <a:ext uri="{FF2B5EF4-FFF2-40B4-BE49-F238E27FC236}">
+                <a16:creationId xmlns:a16="http://schemas.microsoft.com/office/drawing/2014/main" id="{476B7A87-A107-B643-A35E-87CF710C8D1C}"/>
+              </a:ext>
+            </a:extLst>
+          </p:cNvPr>
+          <p:cNvSpPr>
+            <a:spLocks noGrp="1"/>
+          </p:cNvSpPr>
+          <p:nvPr>
+            <p:ph type="title"/>
+          </p:nvPr>
+        </p:nvSpPr>
+        <p:spPr/>
+        <p:txBody>
+          <a:bodyPr/>
+          <a:lstStyle/>
+          <a:p>
+            <a:r>
+              <a:rPr lang="en-US" dirty="0"/>
+              <a:t>Animal Profile Logs </a:t>
+            </a:r>
+            <a:r>
+              <a:rPr lang="en-US" sz="3200" dirty="0"/>
+              <a:t>(Treatment/Comment/Issue Logs)</a:t>
+            </a:r>
+          </a:p>
+        </p:txBody>
+      </p:sp>
+      <p:sp>
+        <p:nvSpPr>
+          <p:cNvPr id="10" name="TextBox 9">
+            <a:extLst>
+              <a:ext uri="{FF2B5EF4-FFF2-40B4-BE49-F238E27FC236}">
+                <a16:creationId xmlns:a16="http://schemas.microsoft.com/office/drawing/2014/main" id="{A61A72A8-567C-A940-9B31-68152D3B1D40}"/>
+              </a:ext>
+            </a:extLst>
+          </p:cNvPr>
+          <p:cNvSpPr txBox="1"/>
+          <p:nvPr/>
+        </p:nvSpPr>
+        <p:spPr>
+          <a:xfrm>
+            <a:off x="9171115" y="1582219"/>
+            <a:ext cx="2808552" cy="2031325"/>
+          </a:xfrm>
+          <a:prstGeom prst="rect">
+            <a:avLst/>
+          </a:prstGeom>
+          <a:noFill/>
+        </p:spPr>
+        <p:txBody>
+          <a:bodyPr wrap="square" rtlCol="0">
+            <a:spAutoFit/>
+          </a:bodyPr>
+          <a:lstStyle/>
+          <a:p>
+            <a:r>
+              <a:rPr lang="en-US" dirty="0"/>
+              <a:t>Student: Have access to “Edit” but not “Remove” buttons at bottom of Log.</a:t>
+            </a:r>
+          </a:p>
+          <a:p>
+            <a:endParaRPr lang="en-US" dirty="0"/>
+          </a:p>
+          <a:p>
+            <a:r>
+              <a:rPr lang="en-US" dirty="0"/>
+              <a:t>All others users: Have access to both buttons</a:t>
+            </a:r>
+          </a:p>
+          <a:p>
+            <a:endParaRPr lang="en-US" dirty="0"/>
+          </a:p>
+        </p:txBody>
+      </p:sp>
+      <p:pic>
+        <p:nvPicPr>
+          <p:cNvPr id="14" name="Picture 13">
+            <a:extLst>
+              <a:ext uri="{FF2B5EF4-FFF2-40B4-BE49-F238E27FC236}">
+                <a16:creationId xmlns:a16="http://schemas.microsoft.com/office/drawing/2014/main" id="{E9448740-D9A5-3C48-9757-8B1DCA57151C}"/>
+              </a:ext>
+            </a:extLst>
+          </p:cNvPr>
+          <p:cNvPicPr>
+            <a:picLocks noChangeAspect="1"/>
+          </p:cNvPicPr>
+          <p:nvPr/>
+        </p:nvPicPr>
+        <p:blipFill>
+          <a:blip r:embed="rId2">
+            <a:extLst>
+              <a:ext uri="{28A0092B-C50C-407E-A947-70E740481C1C}">
+                <a14:useLocalDpi xmlns:a14="http://schemas.microsoft.com/office/drawing/2010/main" val="0"/>
+              </a:ext>
+            </a:extLst>
+          </a:blip>
+          <a:stretch>
+            <a:fillRect/>
+          </a:stretch>
+        </p:blipFill>
+        <p:spPr>
+          <a:xfrm>
+            <a:off x="207565" y="1263721"/>
+            <a:ext cx="2726433" cy="5836802"/>
+          </a:xfrm>
+          <a:prstGeom prst="rect">
+            <a:avLst/>
+          </a:prstGeom>
+        </p:spPr>
+      </p:pic>
+      <p:pic>
+        <p:nvPicPr>
+          <p:cNvPr id="16" name="Picture 15">
+            <a:extLst>
+              <a:ext uri="{FF2B5EF4-FFF2-40B4-BE49-F238E27FC236}">
+                <a16:creationId xmlns:a16="http://schemas.microsoft.com/office/drawing/2014/main" id="{3D72388B-EE4D-D843-B040-9B220771B362}"/>
+              </a:ext>
+            </a:extLst>
+          </p:cNvPr>
+          <p:cNvPicPr>
+            <a:picLocks noChangeAspect="1"/>
+          </p:cNvPicPr>
+          <p:nvPr/>
+        </p:nvPicPr>
+        <p:blipFill>
+          <a:blip r:embed="rId3">
+            <a:extLst>
+              <a:ext uri="{28A0092B-C50C-407E-A947-70E740481C1C}">
+                <a14:useLocalDpi xmlns:a14="http://schemas.microsoft.com/office/drawing/2010/main" val="0"/>
+              </a:ext>
+            </a:extLst>
+          </a:blip>
+          <a:stretch>
+            <a:fillRect/>
+          </a:stretch>
+        </p:blipFill>
+        <p:spPr>
+          <a:xfrm>
+            <a:off x="2967593" y="1191798"/>
+            <a:ext cx="2760028" cy="5908725"/>
+          </a:xfrm>
+          <a:prstGeom prst="rect">
+            <a:avLst/>
+          </a:prstGeom>
+        </p:spPr>
+      </p:pic>
+      <p:pic>
+        <p:nvPicPr>
+          <p:cNvPr id="18" name="Picture 17">
+            <a:extLst>
+              <a:ext uri="{FF2B5EF4-FFF2-40B4-BE49-F238E27FC236}">
+                <a16:creationId xmlns:a16="http://schemas.microsoft.com/office/drawing/2014/main" id="{B9362761-1D1C-2A46-814C-3464F2011709}"/>
+              </a:ext>
+            </a:extLst>
+          </p:cNvPr>
+          <p:cNvPicPr>
+            <a:picLocks noChangeAspect="1"/>
+          </p:cNvPicPr>
+          <p:nvPr/>
+        </p:nvPicPr>
+        <p:blipFill>
+          <a:blip r:embed="rId4">
+            <a:extLst>
+              <a:ext uri="{28A0092B-C50C-407E-A947-70E740481C1C}">
+                <a14:useLocalDpi xmlns:a14="http://schemas.microsoft.com/office/drawing/2010/main" val="0"/>
+              </a:ext>
+            </a:extLst>
+          </a:blip>
+          <a:stretch>
+            <a:fillRect/>
+          </a:stretch>
+        </p:blipFill>
+        <p:spPr>
+          <a:xfrm>
+            <a:off x="5613960" y="1191797"/>
+            <a:ext cx="2760029" cy="5908726"/>
+          </a:xfrm>
+          <a:prstGeom prst="rect">
+            <a:avLst/>
+          </a:prstGeom>
+        </p:spPr>
+      </p:pic>
+    </p:spTree>
+    <p:extLst>
+      <p:ext uri="{BB962C8B-B14F-4D97-AF65-F5344CB8AC3E}">
+        <p14:creationId xmlns:p14="http://schemas.microsoft.com/office/powerpoint/2010/main" val="4167044916"/>
+      </p:ext>
+    </p:extLst>
+  </p:cSld>
+  <p:clrMapOvr>
+    <a:masterClrMapping/>
+  </p:clrMapOvr>
+</p:sld>
+</file>
+
 <file path=ppt/theme/theme1.xml><?xml version="1.0" encoding="utf-8"?>
 <a:theme xmlns:a="http://schemas.openxmlformats.org/drawingml/2006/main" name="Office Theme">
   <a:themeElements>

</xml_diff>